<commit_message>
Updated userGuide with more info and graphs - Delete - Undo , Redo
</commit_message>
<xml_diff>
--- a/docs/diagrams/UserGuide Drawings.pptx
+++ b/docs/diagrams/UserGuide Drawings.pptx
@@ -6,6 +6,8 @@
   </p:sldMasterIdLst>
   <p:sldIdLst>
     <p:sldId id="256" r:id="rId2"/>
+    <p:sldId id="257" r:id="rId3"/>
+    <p:sldId id="258" r:id="rId4"/>
   </p:sldIdLst>
   <p:sldSz cx="12192000" cy="6858000"/>
   <p:notesSz cx="6858000" cy="9144000"/>
@@ -104,6 +106,11 @@
       </a:defRPr>
     </a:lvl9pPr>
   </p:defaultTextStyle>
+  <p:extLst>
+    <p:ext uri="{EFAFB233-063F-42B5-8137-9DF3F51BA10A}">
+      <p15:sldGuideLst xmlns:p15="http://schemas.microsoft.com/office/powerpoint/2012/main"/>
+    </p:ext>
+  </p:extLst>
 </p:presentation>
 </file>
 
@@ -238,7 +245,7 @@
           <a:p>
             <a:fld id="{3798F79D-4DD3-4E11-8073-015D66C43647}" type="datetimeFigureOut">
               <a:rPr lang="en-SG" smtClean="0"/>
-              <a:t>3/10/2016</a:t>
+              <a:t>4/10/2016</a:t>
             </a:fld>
             <a:endParaRPr lang="en-SG"/>
           </a:p>
@@ -408,7 +415,7 @@
           <a:p>
             <a:fld id="{3798F79D-4DD3-4E11-8073-015D66C43647}" type="datetimeFigureOut">
               <a:rPr lang="en-SG" smtClean="0"/>
-              <a:t>3/10/2016</a:t>
+              <a:t>4/10/2016</a:t>
             </a:fld>
             <a:endParaRPr lang="en-SG"/>
           </a:p>
@@ -588,7 +595,7 @@
           <a:p>
             <a:fld id="{3798F79D-4DD3-4E11-8073-015D66C43647}" type="datetimeFigureOut">
               <a:rPr lang="en-SG" smtClean="0"/>
-              <a:t>3/10/2016</a:t>
+              <a:t>4/10/2016</a:t>
             </a:fld>
             <a:endParaRPr lang="en-SG"/>
           </a:p>
@@ -758,7 +765,7 @@
           <a:p>
             <a:fld id="{3798F79D-4DD3-4E11-8073-015D66C43647}" type="datetimeFigureOut">
               <a:rPr lang="en-SG" smtClean="0"/>
-              <a:t>3/10/2016</a:t>
+              <a:t>4/10/2016</a:t>
             </a:fld>
             <a:endParaRPr lang="en-SG"/>
           </a:p>
@@ -1004,7 +1011,7 @@
           <a:p>
             <a:fld id="{3798F79D-4DD3-4E11-8073-015D66C43647}" type="datetimeFigureOut">
               <a:rPr lang="en-SG" smtClean="0"/>
-              <a:t>3/10/2016</a:t>
+              <a:t>4/10/2016</a:t>
             </a:fld>
             <a:endParaRPr lang="en-SG"/>
           </a:p>
@@ -1236,7 +1243,7 @@
           <a:p>
             <a:fld id="{3798F79D-4DD3-4E11-8073-015D66C43647}" type="datetimeFigureOut">
               <a:rPr lang="en-SG" smtClean="0"/>
-              <a:t>3/10/2016</a:t>
+              <a:t>4/10/2016</a:t>
             </a:fld>
             <a:endParaRPr lang="en-SG"/>
           </a:p>
@@ -1603,7 +1610,7 @@
           <a:p>
             <a:fld id="{3798F79D-4DD3-4E11-8073-015D66C43647}" type="datetimeFigureOut">
               <a:rPr lang="en-SG" smtClean="0"/>
-              <a:t>3/10/2016</a:t>
+              <a:t>4/10/2016</a:t>
             </a:fld>
             <a:endParaRPr lang="en-SG"/>
           </a:p>
@@ -1721,7 +1728,7 @@
           <a:p>
             <a:fld id="{3798F79D-4DD3-4E11-8073-015D66C43647}" type="datetimeFigureOut">
               <a:rPr lang="en-SG" smtClean="0"/>
-              <a:t>3/10/2016</a:t>
+              <a:t>4/10/2016</a:t>
             </a:fld>
             <a:endParaRPr lang="en-SG"/>
           </a:p>
@@ -1816,7 +1823,7 @@
           <a:p>
             <a:fld id="{3798F79D-4DD3-4E11-8073-015D66C43647}" type="datetimeFigureOut">
               <a:rPr lang="en-SG" smtClean="0"/>
-              <a:t>3/10/2016</a:t>
+              <a:t>4/10/2016</a:t>
             </a:fld>
             <a:endParaRPr lang="en-SG"/>
           </a:p>
@@ -2093,7 +2100,7 @@
           <a:p>
             <a:fld id="{3798F79D-4DD3-4E11-8073-015D66C43647}" type="datetimeFigureOut">
               <a:rPr lang="en-SG" smtClean="0"/>
-              <a:t>3/10/2016</a:t>
+              <a:t>4/10/2016</a:t>
             </a:fld>
             <a:endParaRPr lang="en-SG"/>
           </a:p>
@@ -2346,7 +2353,7 @@
           <a:p>
             <a:fld id="{3798F79D-4DD3-4E11-8073-015D66C43647}" type="datetimeFigureOut">
               <a:rPr lang="en-SG" smtClean="0"/>
-              <a:t>3/10/2016</a:t>
+              <a:t>4/10/2016</a:t>
             </a:fld>
             <a:endParaRPr lang="en-SG"/>
           </a:p>
@@ -2559,7 +2566,7 @@
           <a:p>
             <a:fld id="{3798F79D-4DD3-4E11-8073-015D66C43647}" type="datetimeFigureOut">
               <a:rPr lang="en-SG" smtClean="0"/>
-              <a:t>3/10/2016</a:t>
+              <a:t>4/10/2016</a:t>
             </a:fld>
             <a:endParaRPr lang="en-SG"/>
           </a:p>
@@ -2972,7 +2979,7 @@
         </p:nvGrpSpPr>
         <p:grpSpPr>
           <a:xfrm>
-            <a:off x="1528224" y="154304"/>
+            <a:off x="735010" y="-121117"/>
             <a:ext cx="7745408" cy="6490336"/>
             <a:chOff x="2488344" y="901064"/>
             <a:chExt cx="7745408" cy="6490336"/>
@@ -3391,6 +3398,863 @@
 </p:sld>
 </file>
 
+<file path=ppt/slides/slide2.xml><?xml version="1.0" encoding="utf-8"?>
+<p:sld xmlns:a="http://schemas.openxmlformats.org/drawingml/2006/main" xmlns:r="http://schemas.openxmlformats.org/officeDocument/2006/relationships" xmlns:p="http://schemas.openxmlformats.org/presentationml/2006/main">
+  <p:cSld>
+    <p:spTree>
+      <p:nvGrpSpPr>
+        <p:cNvPr id="1" name=""/>
+        <p:cNvGrpSpPr/>
+        <p:nvPr/>
+      </p:nvGrpSpPr>
+      <p:grpSpPr>
+        <a:xfrm>
+          <a:off x="0" y="0"/>
+          <a:ext cx="0" cy="0"/>
+          <a:chOff x="0" y="0"/>
+          <a:chExt cx="0" cy="0"/>
+        </a:xfrm>
+      </p:grpSpPr>
+      <p:graphicFrame>
+        <p:nvGraphicFramePr>
+          <p:cNvPr id="5" name="Table 4"/>
+          <p:cNvGraphicFramePr>
+            <a:graphicFrameLocks noGrp="1"/>
+          </p:cNvGraphicFramePr>
+          <p:nvPr>
+            <p:extLst>
+              <p:ext uri="{D42A27DB-BD31-4B8C-83A1-F6EECF244321}">
+                <p14:modId xmlns:p14="http://schemas.microsoft.com/office/powerpoint/2010/main" val="2209077400"/>
+              </p:ext>
+            </p:extLst>
+          </p:nvPr>
+        </p:nvGraphicFramePr>
+        <p:xfrm>
+          <a:off x="2360180" y="3018640"/>
+          <a:ext cx="208280" cy="365760"/>
+        </p:xfrm>
+        <a:graphic>
+          <a:graphicData uri="http://schemas.openxmlformats.org/drawingml/2006/table">
+            <a:tbl>
+              <a:tblPr/>
+              <a:tblGrid>
+                <a:gridCol w="208280"/>
+              </a:tblGrid>
+              <a:tr h="0">
+                <a:tc>
+                  <a:txBody>
+                    <a:bodyPr/>
+                    <a:lstStyle/>
+                    <a:p>
+                      <a:endParaRPr lang="en-SG" dirty="0"/>
+                    </a:p>
+                  </a:txBody>
+                  <a:tcPr>
+                    <a:lnL w="12700" cmpd="sng">
+                      <a:solidFill>
+                        <a:schemeClr val="bg1"/>
+                      </a:solidFill>
+                      <a:prstDash val="solid"/>
+                    </a:lnL>
+                    <a:lnR w="12700" cmpd="sng">
+                      <a:solidFill>
+                        <a:schemeClr val="bg1"/>
+                      </a:solidFill>
+                      <a:prstDash val="solid"/>
+                    </a:lnR>
+                    <a:lnT w="12700" cmpd="sng">
+                      <a:solidFill>
+                        <a:schemeClr val="bg1"/>
+                      </a:solidFill>
+                      <a:prstDash val="solid"/>
+                    </a:lnT>
+                    <a:lnB w="12700" cmpd="sng">
+                      <a:solidFill>
+                        <a:schemeClr val="bg1"/>
+                      </a:solidFill>
+                      <a:prstDash val="solid"/>
+                    </a:lnB>
+                  </a:tcPr>
+                </a:tc>
+              </a:tr>
+            </a:tbl>
+          </a:graphicData>
+        </a:graphic>
+      </p:graphicFrame>
+      <p:grpSp>
+        <p:nvGrpSpPr>
+          <p:cNvPr id="17" name="Group 16"/>
+          <p:cNvGrpSpPr/>
+          <p:nvPr/>
+        </p:nvGrpSpPr>
+        <p:grpSpPr>
+          <a:xfrm>
+            <a:off x="1678244" y="4738069"/>
+            <a:ext cx="7745408" cy="1737360"/>
+            <a:chOff x="4101404" y="4832979"/>
+            <a:chExt cx="7745408" cy="1737360"/>
+          </a:xfrm>
+        </p:grpSpPr>
+        <p:sp>
+          <p:nvSpPr>
+            <p:cNvPr id="10" name="Rectangle 9"/>
+            <p:cNvSpPr/>
+            <p:nvPr/>
+          </p:nvSpPr>
+          <p:spPr>
+            <a:xfrm>
+              <a:off x="4101404" y="5960739"/>
+              <a:ext cx="7745408" cy="609600"/>
+            </a:xfrm>
+            <a:prstGeom prst="rect">
+              <a:avLst/>
+            </a:prstGeom>
+            <a:solidFill>
+              <a:schemeClr val="tx2">
+                <a:lumMod val="75000"/>
+              </a:schemeClr>
+            </a:solidFill>
+            <a:ln>
+              <a:noFill/>
+            </a:ln>
+            <a:effectLst>
+              <a:outerShdw blurRad="107950" dist="12700" dir="5400000" algn="ctr">
+                <a:srgbClr val="000000"/>
+              </a:outerShdw>
+            </a:effectLst>
+            <a:scene3d>
+              <a:camera prst="orthographicFront">
+                <a:rot lat="0" lon="0" rev="0"/>
+              </a:camera>
+              <a:lightRig rig="soft" dir="t">
+                <a:rot lat="0" lon="0" rev="0"/>
+              </a:lightRig>
+            </a:scene3d>
+            <a:sp3d contourW="44450" prstMaterial="matte">
+              <a:bevelT w="63500" h="63500" prst="artDeco"/>
+              <a:contourClr>
+                <a:srgbClr val="FFFFFF"/>
+              </a:contourClr>
+            </a:sp3d>
+          </p:spPr>
+          <p:style>
+            <a:lnRef idx="0">
+              <a:schemeClr val="accent5"/>
+            </a:lnRef>
+            <a:fillRef idx="1003">
+              <a:schemeClr val="dk2"/>
+            </a:fillRef>
+            <a:effectRef idx="3">
+              <a:schemeClr val="accent5"/>
+            </a:effectRef>
+            <a:fontRef idx="minor">
+              <a:schemeClr val="lt1"/>
+            </a:fontRef>
+          </p:style>
+          <p:txBody>
+            <a:bodyPr rtlCol="0" anchor="ctr"/>
+            <a:lstStyle/>
+            <a:p>
+              <a:r>
+                <a:rPr lang="en-SG" dirty="0" smtClean="0"/>
+                <a:t>&gt;&gt; </a:t>
+              </a:r>
+              <a:r>
+                <a:rPr lang="en-SG" dirty="0"/>
+                <a:t> </a:t>
+              </a:r>
+              <a:r>
+                <a:rPr lang="en-SG" dirty="0" smtClean="0"/>
+                <a:t>delete 1</a:t>
+              </a:r>
+              <a:endParaRPr lang="en-SG" dirty="0"/>
+            </a:p>
+          </p:txBody>
+        </p:sp>
+        <p:sp>
+          <p:nvSpPr>
+            <p:cNvPr id="11" name="Rectangle 10"/>
+            <p:cNvSpPr/>
+            <p:nvPr/>
+          </p:nvSpPr>
+          <p:spPr>
+            <a:xfrm>
+              <a:off x="4101404" y="4832979"/>
+              <a:ext cx="7745408" cy="1127760"/>
+            </a:xfrm>
+            <a:prstGeom prst="rect">
+              <a:avLst/>
+            </a:prstGeom>
+            <a:solidFill>
+              <a:schemeClr val="tx2">
+                <a:lumMod val="40000"/>
+                <a:lumOff val="60000"/>
+              </a:schemeClr>
+            </a:solidFill>
+            <a:ln>
+              <a:noFill/>
+            </a:ln>
+            <a:effectLst>
+              <a:outerShdw blurRad="107950" dist="12700" dir="5400000" algn="ctr">
+                <a:srgbClr val="000000"/>
+              </a:outerShdw>
+            </a:effectLst>
+            <a:scene3d>
+              <a:camera prst="orthographicFront">
+                <a:rot lat="0" lon="0" rev="0"/>
+              </a:camera>
+              <a:lightRig rig="soft" dir="t">
+                <a:rot lat="0" lon="0" rev="0"/>
+              </a:lightRig>
+            </a:scene3d>
+            <a:sp3d contourW="44450" prstMaterial="matte">
+              <a:bevelT w="63500" h="63500" prst="artDeco"/>
+              <a:contourClr>
+                <a:srgbClr val="FFFFFF"/>
+              </a:contourClr>
+            </a:sp3d>
+          </p:spPr>
+          <p:style>
+            <a:lnRef idx="2">
+              <a:schemeClr val="accent1">
+                <a:shade val="50000"/>
+              </a:schemeClr>
+            </a:lnRef>
+            <a:fillRef idx="1">
+              <a:schemeClr val="accent1"/>
+            </a:fillRef>
+            <a:effectRef idx="0">
+              <a:schemeClr val="accent1"/>
+            </a:effectRef>
+            <a:fontRef idx="minor">
+              <a:schemeClr val="lt1"/>
+            </a:fontRef>
+          </p:style>
+          <p:txBody>
+            <a:bodyPr rtlCol="0" anchor="t" anchorCtr="0"/>
+            <a:lstStyle/>
+            <a:p>
+              <a:r>
+                <a:rPr lang="en-SG" sz="2400" dirty="0" smtClean="0">
+                  <a:solidFill>
+                    <a:schemeClr val="tx1"/>
+                  </a:solidFill>
+                </a:rPr>
+                <a:t>Task Deleted : Archery Introduction</a:t>
+              </a:r>
+              <a:endParaRPr lang="en-SG" dirty="0">
+                <a:solidFill>
+                  <a:schemeClr val="tx1"/>
+                </a:solidFill>
+              </a:endParaRPr>
+            </a:p>
+          </p:txBody>
+        </p:sp>
+      </p:grpSp>
+      <p:sp>
+        <p:nvSpPr>
+          <p:cNvPr id="8" name="Rectangle 7"/>
+          <p:cNvSpPr/>
+          <p:nvPr/>
+        </p:nvSpPr>
+        <p:spPr>
+          <a:xfrm>
+            <a:off x="1678244" y="0"/>
+            <a:ext cx="7745407" cy="581188"/>
+          </a:xfrm>
+          <a:prstGeom prst="rect">
+            <a:avLst/>
+          </a:prstGeom>
+          <a:solidFill>
+            <a:schemeClr val="tx1">
+              <a:lumMod val="65000"/>
+              <a:lumOff val="35000"/>
+            </a:schemeClr>
+          </a:solidFill>
+          <a:ln>
+            <a:noFill/>
+          </a:ln>
+          <a:effectLst>
+            <a:outerShdw blurRad="107950" dist="12700" dir="5400000" algn="ctr">
+              <a:srgbClr val="000000"/>
+            </a:outerShdw>
+          </a:effectLst>
+          <a:scene3d>
+            <a:camera prst="orthographicFront">
+              <a:rot lat="0" lon="0" rev="0"/>
+            </a:camera>
+            <a:lightRig rig="soft" dir="t">
+              <a:rot lat="0" lon="0" rev="0"/>
+            </a:lightRig>
+          </a:scene3d>
+          <a:sp3d contourW="44450" prstMaterial="matte">
+            <a:bevelT w="63500" h="63500" prst="artDeco"/>
+            <a:contourClr>
+              <a:srgbClr val="FFFFFF"/>
+            </a:contourClr>
+          </a:sp3d>
+        </p:spPr>
+        <p:style>
+          <a:lnRef idx="2">
+            <a:schemeClr val="accent1">
+              <a:shade val="50000"/>
+            </a:schemeClr>
+          </a:lnRef>
+          <a:fillRef idx="1">
+            <a:schemeClr val="accent1"/>
+          </a:fillRef>
+          <a:effectRef idx="0">
+            <a:schemeClr val="accent1"/>
+          </a:effectRef>
+          <a:fontRef idx="minor">
+            <a:schemeClr val="lt1"/>
+          </a:fontRef>
+        </p:style>
+        <p:txBody>
+          <a:bodyPr rtlCol="0" anchor="ctr"/>
+          <a:lstStyle/>
+          <a:p>
+            <a:pPr algn="ctr"/>
+            <a:r>
+              <a:rPr lang="en-SG" sz="2800" dirty="0" err="1" smtClean="0">
+                <a:latin typeface="Comic Sans MS" panose="030F0702030302020204" pitchFamily="66" charset="0"/>
+                <a:cs typeface="Segoe UI Semibold" panose="020B0702040204020203" pitchFamily="34" charset="0"/>
+              </a:rPr>
+              <a:t>SmartyDo</a:t>
+            </a:r>
+            <a:endParaRPr lang="en-SG" sz="2800" dirty="0">
+              <a:latin typeface="Comic Sans MS" panose="030F0702030302020204" pitchFamily="66" charset="0"/>
+              <a:cs typeface="Segoe UI Semibold" panose="020B0702040204020203" pitchFamily="34" charset="0"/>
+            </a:endParaRPr>
+          </a:p>
+        </p:txBody>
+      </p:sp>
+      <p:pic>
+        <p:nvPicPr>
+          <p:cNvPr id="13" name="Picture 12"/>
+          <p:cNvPicPr>
+            <a:picLocks noChangeAspect="1"/>
+          </p:cNvPicPr>
+          <p:nvPr/>
+        </p:nvPicPr>
+        <p:blipFill>
+          <a:blip r:embed="rId2"/>
+          <a:stretch>
+            <a:fillRect/>
+          </a:stretch>
+        </p:blipFill>
+        <p:spPr>
+          <a:xfrm>
+            <a:off x="1678244" y="638344"/>
+            <a:ext cx="4265831" cy="4114964"/>
+          </a:xfrm>
+          <a:prstGeom prst="rect">
+            <a:avLst/>
+          </a:prstGeom>
+          <a:ln>
+            <a:noFill/>
+          </a:ln>
+          <a:effectLst>
+            <a:outerShdw blurRad="107950" dist="12700" dir="5400000" algn="ctr">
+              <a:srgbClr val="000000"/>
+            </a:outerShdw>
+          </a:effectLst>
+          <a:scene3d>
+            <a:camera prst="orthographicFront">
+              <a:rot lat="0" lon="0" rev="0"/>
+            </a:camera>
+            <a:lightRig rig="soft" dir="t">
+              <a:rot lat="0" lon="0" rev="0"/>
+            </a:lightRig>
+          </a:scene3d>
+          <a:sp3d contourW="44450" prstMaterial="matte">
+            <a:bevelT w="63500" h="63500" prst="artDeco"/>
+            <a:contourClr>
+              <a:srgbClr val="FFFFFF"/>
+            </a:contourClr>
+          </a:sp3d>
+        </p:spPr>
+      </p:pic>
+      <p:sp>
+        <p:nvSpPr>
+          <p:cNvPr id="14" name="TextBox 13"/>
+          <p:cNvSpPr txBox="1">
+            <a:spLocks noChangeAspect="1"/>
+          </p:cNvSpPr>
+          <p:nvPr/>
+        </p:nvSpPr>
+        <p:spPr>
+          <a:xfrm>
+            <a:off x="5979263" y="638344"/>
+            <a:ext cx="3409200" cy="4114966"/>
+          </a:xfrm>
+          <a:prstGeom prst="rect">
+            <a:avLst/>
+          </a:prstGeom>
+          <a:solidFill>
+            <a:schemeClr val="tx1">
+              <a:lumMod val="65000"/>
+              <a:lumOff val="35000"/>
+            </a:schemeClr>
+          </a:solidFill>
+          <a:ln>
+            <a:noFill/>
+          </a:ln>
+          <a:effectLst>
+            <a:outerShdw blurRad="107950" dist="12700" dir="5400000" algn="ctr">
+              <a:srgbClr val="000000"/>
+            </a:outerShdw>
+          </a:effectLst>
+          <a:scene3d>
+            <a:camera prst="orthographicFront">
+              <a:rot lat="0" lon="0" rev="0"/>
+            </a:camera>
+            <a:lightRig rig="soft" dir="t">
+              <a:rot lat="0" lon="0" rev="0"/>
+            </a:lightRig>
+          </a:scene3d>
+          <a:sp3d contourW="44450" prstMaterial="matte">
+            <a:bevelT w="63500" h="63500" prst="artDeco"/>
+            <a:contourClr>
+              <a:srgbClr val="FFFFFF"/>
+            </a:contourClr>
+          </a:sp3d>
+        </p:spPr>
+        <p:txBody>
+          <a:bodyPr wrap="square" rtlCol="0">
+            <a:noAutofit/>
+          </a:bodyPr>
+          <a:lstStyle/>
+          <a:p>
+            <a:r>
+              <a:rPr lang="en-SG" dirty="0" smtClean="0">
+                <a:solidFill>
+                  <a:schemeClr val="bg1"/>
+                </a:solidFill>
+              </a:rPr>
+              <a:t> 	</a:t>
+            </a:r>
+            <a:r>
+              <a:rPr lang="en-SG" sz="2800" dirty="0" smtClean="0">
+                <a:solidFill>
+                  <a:schemeClr val="bg1"/>
+                </a:solidFill>
+              </a:rPr>
+              <a:t>Upcoming</a:t>
+            </a:r>
+            <a:endParaRPr lang="en-SG" dirty="0">
+              <a:solidFill>
+                <a:schemeClr val="bg1"/>
+              </a:solidFill>
+            </a:endParaRPr>
+          </a:p>
+        </p:txBody>
+      </p:sp>
+    </p:spTree>
+    <p:extLst>
+      <p:ext uri="{BB962C8B-B14F-4D97-AF65-F5344CB8AC3E}">
+        <p14:creationId xmlns:p14="http://schemas.microsoft.com/office/powerpoint/2010/main" val="3887241630"/>
+      </p:ext>
+    </p:extLst>
+  </p:cSld>
+  <p:clrMapOvr>
+    <a:masterClrMapping/>
+  </p:clrMapOvr>
+</p:sld>
+</file>
+
+<file path=ppt/slides/slide3.xml><?xml version="1.0" encoding="utf-8"?>
+<p:sld xmlns:a="http://schemas.openxmlformats.org/drawingml/2006/main" xmlns:r="http://schemas.openxmlformats.org/officeDocument/2006/relationships" xmlns:p="http://schemas.openxmlformats.org/presentationml/2006/main">
+  <p:cSld>
+    <p:spTree>
+      <p:nvGrpSpPr>
+        <p:cNvPr id="1" name=""/>
+        <p:cNvGrpSpPr/>
+        <p:nvPr/>
+      </p:nvGrpSpPr>
+      <p:grpSpPr>
+        <a:xfrm>
+          <a:off x="0" y="0"/>
+          <a:ext cx="0" cy="0"/>
+          <a:chOff x="0" y="0"/>
+          <a:chExt cx="0" cy="0"/>
+        </a:xfrm>
+      </p:grpSpPr>
+      <p:grpSp>
+        <p:nvGrpSpPr>
+          <p:cNvPr id="5" name="Group 4"/>
+          <p:cNvGrpSpPr/>
+          <p:nvPr/>
+        </p:nvGrpSpPr>
+        <p:grpSpPr>
+          <a:xfrm>
+            <a:off x="2425004" y="4738069"/>
+            <a:ext cx="7274812" cy="1737360"/>
+            <a:chOff x="4101404" y="4832979"/>
+            <a:chExt cx="7745408" cy="1737360"/>
+          </a:xfrm>
+        </p:grpSpPr>
+        <p:sp>
+          <p:nvSpPr>
+            <p:cNvPr id="6" name="Rectangle 5"/>
+            <p:cNvSpPr/>
+            <p:nvPr/>
+          </p:nvSpPr>
+          <p:spPr>
+            <a:xfrm>
+              <a:off x="4101404" y="5960739"/>
+              <a:ext cx="7745408" cy="609600"/>
+            </a:xfrm>
+            <a:prstGeom prst="rect">
+              <a:avLst/>
+            </a:prstGeom>
+            <a:solidFill>
+              <a:schemeClr val="tx2">
+                <a:lumMod val="75000"/>
+              </a:schemeClr>
+            </a:solidFill>
+            <a:ln>
+              <a:noFill/>
+            </a:ln>
+            <a:effectLst>
+              <a:outerShdw blurRad="107950" dist="12700" dir="5400000" algn="ctr">
+                <a:srgbClr val="000000"/>
+              </a:outerShdw>
+            </a:effectLst>
+            <a:scene3d>
+              <a:camera prst="orthographicFront">
+                <a:rot lat="0" lon="0" rev="0"/>
+              </a:camera>
+              <a:lightRig rig="soft" dir="t">
+                <a:rot lat="0" lon="0" rev="0"/>
+              </a:lightRig>
+            </a:scene3d>
+            <a:sp3d contourW="44450" prstMaterial="matte">
+              <a:bevelT w="63500" h="63500" prst="artDeco"/>
+              <a:contourClr>
+                <a:srgbClr val="FFFFFF"/>
+              </a:contourClr>
+            </a:sp3d>
+          </p:spPr>
+          <p:style>
+            <a:lnRef idx="0">
+              <a:schemeClr val="accent5"/>
+            </a:lnRef>
+            <a:fillRef idx="1003">
+              <a:schemeClr val="dk2"/>
+            </a:fillRef>
+            <a:effectRef idx="3">
+              <a:schemeClr val="accent5"/>
+            </a:effectRef>
+            <a:fontRef idx="minor">
+              <a:schemeClr val="lt1"/>
+            </a:fontRef>
+          </p:style>
+          <p:txBody>
+            <a:bodyPr rtlCol="0" anchor="ctr"/>
+            <a:lstStyle/>
+            <a:p>
+              <a:r>
+                <a:rPr lang="en-SG" dirty="0" smtClean="0"/>
+                <a:t>&gt;&gt; </a:t>
+              </a:r>
+              <a:r>
+                <a:rPr lang="en-SG" dirty="0"/>
+                <a:t> </a:t>
+              </a:r>
+              <a:r>
+                <a:rPr lang="en-SG" dirty="0" smtClean="0"/>
+                <a:t>Redo</a:t>
+              </a:r>
+              <a:endParaRPr lang="en-SG" dirty="0"/>
+            </a:p>
+          </p:txBody>
+        </p:sp>
+        <p:sp>
+          <p:nvSpPr>
+            <p:cNvPr id="7" name="Rectangle 6"/>
+            <p:cNvSpPr/>
+            <p:nvPr/>
+          </p:nvSpPr>
+          <p:spPr>
+            <a:xfrm>
+              <a:off x="4101404" y="4832979"/>
+              <a:ext cx="7745408" cy="1127760"/>
+            </a:xfrm>
+            <a:prstGeom prst="rect">
+              <a:avLst/>
+            </a:prstGeom>
+            <a:solidFill>
+              <a:schemeClr val="tx2">
+                <a:lumMod val="40000"/>
+                <a:lumOff val="60000"/>
+              </a:schemeClr>
+            </a:solidFill>
+            <a:ln>
+              <a:noFill/>
+            </a:ln>
+            <a:effectLst>
+              <a:outerShdw blurRad="107950" dist="12700" dir="5400000" algn="ctr">
+                <a:srgbClr val="000000"/>
+              </a:outerShdw>
+            </a:effectLst>
+            <a:scene3d>
+              <a:camera prst="orthographicFront">
+                <a:rot lat="0" lon="0" rev="0"/>
+              </a:camera>
+              <a:lightRig rig="soft" dir="t">
+                <a:rot lat="0" lon="0" rev="0"/>
+              </a:lightRig>
+            </a:scene3d>
+            <a:sp3d contourW="44450" prstMaterial="matte">
+              <a:bevelT w="63500" h="63500" prst="artDeco"/>
+              <a:contourClr>
+                <a:srgbClr val="FFFFFF"/>
+              </a:contourClr>
+            </a:sp3d>
+          </p:spPr>
+          <p:style>
+            <a:lnRef idx="2">
+              <a:schemeClr val="accent1">
+                <a:shade val="50000"/>
+              </a:schemeClr>
+            </a:lnRef>
+            <a:fillRef idx="1">
+              <a:schemeClr val="accent1"/>
+            </a:fillRef>
+            <a:effectRef idx="0">
+              <a:schemeClr val="accent1"/>
+            </a:effectRef>
+            <a:fontRef idx="minor">
+              <a:schemeClr val="lt1"/>
+            </a:fontRef>
+          </p:style>
+          <p:txBody>
+            <a:bodyPr rtlCol="0" anchor="t" anchorCtr="0"/>
+            <a:lstStyle/>
+            <a:p>
+              <a:r>
+                <a:rPr lang="en-SG" sz="2400" dirty="0" smtClean="0">
+                  <a:solidFill>
+                    <a:schemeClr val="tx1"/>
+                  </a:solidFill>
+                </a:rPr>
+                <a:t>Your previous action delete 1 has been executed</a:t>
+              </a:r>
+              <a:endParaRPr lang="en-SG" dirty="0">
+                <a:solidFill>
+                  <a:schemeClr val="tx1"/>
+                </a:solidFill>
+              </a:endParaRPr>
+            </a:p>
+          </p:txBody>
+        </p:sp>
+      </p:grpSp>
+      <p:sp>
+        <p:nvSpPr>
+          <p:cNvPr id="8" name="Rectangle 7"/>
+          <p:cNvSpPr/>
+          <p:nvPr/>
+        </p:nvSpPr>
+        <p:spPr>
+          <a:xfrm>
+            <a:off x="2425004" y="0"/>
+            <a:ext cx="7274811" cy="581188"/>
+          </a:xfrm>
+          <a:prstGeom prst="rect">
+            <a:avLst/>
+          </a:prstGeom>
+          <a:solidFill>
+            <a:schemeClr val="tx1">
+              <a:lumMod val="65000"/>
+              <a:lumOff val="35000"/>
+            </a:schemeClr>
+          </a:solidFill>
+          <a:ln>
+            <a:noFill/>
+          </a:ln>
+          <a:effectLst>
+            <a:outerShdw blurRad="107950" dist="12700" dir="5400000" algn="ctr">
+              <a:srgbClr val="000000"/>
+            </a:outerShdw>
+          </a:effectLst>
+          <a:scene3d>
+            <a:camera prst="orthographicFront">
+              <a:rot lat="0" lon="0" rev="0"/>
+            </a:camera>
+            <a:lightRig rig="soft" dir="t">
+              <a:rot lat="0" lon="0" rev="0"/>
+            </a:lightRig>
+          </a:scene3d>
+          <a:sp3d contourW="44450" prstMaterial="matte">
+            <a:bevelT w="63500" h="63500" prst="artDeco"/>
+            <a:contourClr>
+              <a:srgbClr val="FFFFFF"/>
+            </a:contourClr>
+          </a:sp3d>
+        </p:spPr>
+        <p:style>
+          <a:lnRef idx="2">
+            <a:schemeClr val="accent1">
+              <a:shade val="50000"/>
+            </a:schemeClr>
+          </a:lnRef>
+          <a:fillRef idx="1">
+            <a:schemeClr val="accent1"/>
+          </a:fillRef>
+          <a:effectRef idx="0">
+            <a:schemeClr val="accent1"/>
+          </a:effectRef>
+          <a:fontRef idx="minor">
+            <a:schemeClr val="lt1"/>
+          </a:fontRef>
+        </p:style>
+        <p:txBody>
+          <a:bodyPr rtlCol="0" anchor="ctr"/>
+          <a:lstStyle/>
+          <a:p>
+            <a:pPr algn="ctr"/>
+            <a:r>
+              <a:rPr lang="en-SG" sz="2800" dirty="0" err="1" smtClean="0">
+                <a:latin typeface="Comic Sans MS" panose="030F0702030302020204" pitchFamily="66" charset="0"/>
+                <a:cs typeface="Segoe UI Semibold" panose="020B0702040204020203" pitchFamily="34" charset="0"/>
+              </a:rPr>
+              <a:t>SmartyDo</a:t>
+            </a:r>
+            <a:endParaRPr lang="en-SG" sz="2800" dirty="0">
+              <a:latin typeface="Comic Sans MS" panose="030F0702030302020204" pitchFamily="66" charset="0"/>
+              <a:cs typeface="Segoe UI Semibold" panose="020B0702040204020203" pitchFamily="34" charset="0"/>
+            </a:endParaRPr>
+          </a:p>
+        </p:txBody>
+      </p:sp>
+      <p:pic>
+        <p:nvPicPr>
+          <p:cNvPr id="9" name="Picture 8"/>
+          <p:cNvPicPr>
+            <a:picLocks noChangeAspect="1"/>
+          </p:cNvPicPr>
+          <p:nvPr/>
+        </p:nvPicPr>
+        <p:blipFill>
+          <a:blip r:embed="rId2"/>
+          <a:stretch>
+            <a:fillRect/>
+          </a:stretch>
+        </p:blipFill>
+        <p:spPr>
+          <a:xfrm>
+            <a:off x="2425003" y="602146"/>
+            <a:ext cx="4006647" cy="4114964"/>
+          </a:xfrm>
+          <a:prstGeom prst="rect">
+            <a:avLst/>
+          </a:prstGeom>
+          <a:ln>
+            <a:noFill/>
+          </a:ln>
+          <a:effectLst>
+            <a:outerShdw blurRad="107950" dist="12700" dir="5400000" algn="ctr">
+              <a:srgbClr val="000000"/>
+            </a:outerShdw>
+          </a:effectLst>
+          <a:scene3d>
+            <a:camera prst="orthographicFront">
+              <a:rot lat="0" lon="0" rev="0"/>
+            </a:camera>
+            <a:lightRig rig="soft" dir="t">
+              <a:rot lat="0" lon="0" rev="0"/>
+            </a:lightRig>
+          </a:scene3d>
+          <a:sp3d contourW="44450" prstMaterial="matte">
+            <a:bevelT w="63500" h="63500" prst="artDeco"/>
+            <a:contourClr>
+              <a:srgbClr val="FFFFFF"/>
+            </a:contourClr>
+          </a:sp3d>
+        </p:spPr>
+      </p:pic>
+      <p:sp>
+        <p:nvSpPr>
+          <p:cNvPr id="10" name="TextBox 9"/>
+          <p:cNvSpPr txBox="1">
+            <a:spLocks noChangeAspect="1"/>
+          </p:cNvSpPr>
+          <p:nvPr/>
+        </p:nvSpPr>
+        <p:spPr>
+          <a:xfrm>
+            <a:off x="6497752" y="623103"/>
+            <a:ext cx="3202063" cy="4114966"/>
+          </a:xfrm>
+          <a:prstGeom prst="rect">
+            <a:avLst/>
+          </a:prstGeom>
+          <a:solidFill>
+            <a:schemeClr val="tx1">
+              <a:lumMod val="65000"/>
+              <a:lumOff val="35000"/>
+            </a:schemeClr>
+          </a:solidFill>
+          <a:ln>
+            <a:noFill/>
+          </a:ln>
+          <a:effectLst>
+            <a:outerShdw blurRad="107950" dist="12700" dir="5400000" algn="ctr">
+              <a:srgbClr val="000000"/>
+            </a:outerShdw>
+          </a:effectLst>
+          <a:scene3d>
+            <a:camera prst="orthographicFront">
+              <a:rot lat="0" lon="0" rev="0"/>
+            </a:camera>
+            <a:lightRig rig="soft" dir="t">
+              <a:rot lat="0" lon="0" rev="0"/>
+            </a:lightRig>
+          </a:scene3d>
+          <a:sp3d contourW="44450" prstMaterial="matte">
+            <a:bevelT w="63500" h="63500" prst="artDeco"/>
+            <a:contourClr>
+              <a:srgbClr val="FFFFFF"/>
+            </a:contourClr>
+          </a:sp3d>
+        </p:spPr>
+        <p:txBody>
+          <a:bodyPr wrap="square" rtlCol="0">
+            <a:noAutofit/>
+          </a:bodyPr>
+          <a:lstStyle/>
+          <a:p>
+            <a:pPr algn="ctr"/>
+            <a:r>
+              <a:rPr lang="en-SG" sz="2800" dirty="0" smtClean="0">
+                <a:solidFill>
+                  <a:schemeClr val="bg1"/>
+                </a:solidFill>
+              </a:rPr>
+              <a:t>Upcoming</a:t>
+            </a:r>
+            <a:endParaRPr lang="en-SG" dirty="0">
+              <a:solidFill>
+                <a:schemeClr val="bg1"/>
+              </a:solidFill>
+            </a:endParaRPr>
+          </a:p>
+        </p:txBody>
+      </p:sp>
+    </p:spTree>
+    <p:extLst>
+      <p:ext uri="{BB962C8B-B14F-4D97-AF65-F5344CB8AC3E}">
+        <p14:creationId xmlns:p14="http://schemas.microsoft.com/office/powerpoint/2010/main" val="3087067415"/>
+      </p:ext>
+    </p:extLst>
+  </p:cSld>
+  <p:clrMapOvr>
+    <a:masterClrMapping/>
+  </p:clrMapOvr>
+</p:sld>
+</file>
+
 <file path=ppt/theme/theme1.xml><?xml version="1.0" encoding="utf-8"?>
 <a:theme xmlns:a="http://schemas.openxmlformats.org/drawingml/2006/main" name="Office Theme">
   <a:themeElements>

</xml_diff>

<commit_message>
Updated User guide and program accordingly. 1. Allowed flexible casing of Month restricted to 1st 3 characters of the month.
TODO: consider allowing 10-10-16
</commit_message>
<xml_diff>
--- a/docs/diagrams/UserGuide Drawings.pptx
+++ b/docs/diagrams/UserGuide Drawings.pptx
@@ -207,7 +207,7 @@
           <a:p>
             <a:fld id="{EA886368-25C7-45BA-8F27-139A1E58B4EB}" type="datetimeFigureOut">
               <a:rPr lang="en-SG" smtClean="0"/>
-              <a:t>9/10/2016</a:t>
+              <a:t>20/10/2016</a:t>
             </a:fld>
             <a:endParaRPr lang="en-SG"/>
           </a:p>
@@ -1003,7 +1003,7 @@
           <a:p>
             <a:fld id="{3798F79D-4DD3-4E11-8073-015D66C43647}" type="datetimeFigureOut">
               <a:rPr lang="en-SG" smtClean="0"/>
-              <a:t>9/10/2016</a:t>
+              <a:t>20/10/2016</a:t>
             </a:fld>
             <a:endParaRPr lang="en-SG"/>
           </a:p>
@@ -1173,7 +1173,7 @@
           <a:p>
             <a:fld id="{3798F79D-4DD3-4E11-8073-015D66C43647}" type="datetimeFigureOut">
               <a:rPr lang="en-SG" smtClean="0"/>
-              <a:t>9/10/2016</a:t>
+              <a:t>20/10/2016</a:t>
             </a:fld>
             <a:endParaRPr lang="en-SG"/>
           </a:p>
@@ -1353,7 +1353,7 @@
           <a:p>
             <a:fld id="{3798F79D-4DD3-4E11-8073-015D66C43647}" type="datetimeFigureOut">
               <a:rPr lang="en-SG" smtClean="0"/>
-              <a:t>9/10/2016</a:t>
+              <a:t>20/10/2016</a:t>
             </a:fld>
             <a:endParaRPr lang="en-SG"/>
           </a:p>
@@ -1523,7 +1523,7 @@
           <a:p>
             <a:fld id="{3798F79D-4DD3-4E11-8073-015D66C43647}" type="datetimeFigureOut">
               <a:rPr lang="en-SG" smtClean="0"/>
-              <a:t>9/10/2016</a:t>
+              <a:t>20/10/2016</a:t>
             </a:fld>
             <a:endParaRPr lang="en-SG"/>
           </a:p>
@@ -1769,7 +1769,7 @@
           <a:p>
             <a:fld id="{3798F79D-4DD3-4E11-8073-015D66C43647}" type="datetimeFigureOut">
               <a:rPr lang="en-SG" smtClean="0"/>
-              <a:t>9/10/2016</a:t>
+              <a:t>20/10/2016</a:t>
             </a:fld>
             <a:endParaRPr lang="en-SG"/>
           </a:p>
@@ -2001,7 +2001,7 @@
           <a:p>
             <a:fld id="{3798F79D-4DD3-4E11-8073-015D66C43647}" type="datetimeFigureOut">
               <a:rPr lang="en-SG" smtClean="0"/>
-              <a:t>9/10/2016</a:t>
+              <a:t>20/10/2016</a:t>
             </a:fld>
             <a:endParaRPr lang="en-SG"/>
           </a:p>
@@ -2368,7 +2368,7 @@
           <a:p>
             <a:fld id="{3798F79D-4DD3-4E11-8073-015D66C43647}" type="datetimeFigureOut">
               <a:rPr lang="en-SG" smtClean="0"/>
-              <a:t>9/10/2016</a:t>
+              <a:t>20/10/2016</a:t>
             </a:fld>
             <a:endParaRPr lang="en-SG"/>
           </a:p>
@@ -2486,7 +2486,7 @@
           <a:p>
             <a:fld id="{3798F79D-4DD3-4E11-8073-015D66C43647}" type="datetimeFigureOut">
               <a:rPr lang="en-SG" smtClean="0"/>
-              <a:t>9/10/2016</a:t>
+              <a:t>20/10/2016</a:t>
             </a:fld>
             <a:endParaRPr lang="en-SG"/>
           </a:p>
@@ -2581,7 +2581,7 @@
           <a:p>
             <a:fld id="{3798F79D-4DD3-4E11-8073-015D66C43647}" type="datetimeFigureOut">
               <a:rPr lang="en-SG" smtClean="0"/>
-              <a:t>9/10/2016</a:t>
+              <a:t>20/10/2016</a:t>
             </a:fld>
             <a:endParaRPr lang="en-SG"/>
           </a:p>
@@ -2858,7 +2858,7 @@
           <a:p>
             <a:fld id="{3798F79D-4DD3-4E11-8073-015D66C43647}" type="datetimeFigureOut">
               <a:rPr lang="en-SG" smtClean="0"/>
-              <a:t>9/10/2016</a:t>
+              <a:t>20/10/2016</a:t>
             </a:fld>
             <a:endParaRPr lang="en-SG"/>
           </a:p>
@@ -3111,7 +3111,7 @@
           <a:p>
             <a:fld id="{3798F79D-4DD3-4E11-8073-015D66C43647}" type="datetimeFigureOut">
               <a:rPr lang="en-SG" smtClean="0"/>
-              <a:t>9/10/2016</a:t>
+              <a:t>20/10/2016</a:t>
             </a:fld>
             <a:endParaRPr lang="en-SG"/>
           </a:p>
@@ -3324,7 +3324,7 @@
           <a:p>
             <a:fld id="{3798F79D-4DD3-4E11-8073-015D66C43647}" type="datetimeFigureOut">
               <a:rPr lang="en-SG" smtClean="0"/>
-              <a:t>9/10/2016</a:t>
+              <a:t>20/10/2016</a:t>
             </a:fld>
             <a:endParaRPr lang="en-SG"/>
           </a:p>
@@ -4468,7 +4468,15 @@
                     <a:schemeClr val="bg1"/>
                   </a:solidFill>
                 </a:rPr>
-                <a:t>add  #CS2103 /n User Guide /d 121016 </a:t>
+                <a:t>add  #CS2103 /n User Guide /d </a:t>
+              </a:r>
+              <a:r>
+                <a:rPr lang="en-SG" b="1" dirty="0" smtClean="0">
+                  <a:solidFill>
+                    <a:schemeClr val="bg1"/>
+                  </a:solidFill>
+                </a:rPr>
+                <a:t>12-10-16 </a:t>
               </a:r>
               <a:endParaRPr lang="en-SG" b="1" dirty="0">
                 <a:solidFill>
@@ -4578,7 +4586,7 @@
             <a:graphicData uri="http://schemas.openxmlformats.org/presentationml/2006/ole">
               <mc:AlternateContent xmlns:mc="http://schemas.openxmlformats.org/markup-compatibility/2006">
                 <mc:Choice xmlns:v="urn:schemas-microsoft-com:vml" Requires="v">
-                  <p:oleObj spid="_x0000_s2055" name="Worksheet" r:id="rId7" imgW="3028999" imgH="1479425" progId="Excel.Sheet.12">
+                  <p:oleObj spid="_x0000_s2057" name="Worksheet" r:id="rId7" imgW="3028999" imgH="1479425" progId="Excel.Sheet.12">
                     <p:embed/>
                   </p:oleObj>
                 </mc:Choice>
@@ -4847,12 +4855,6 @@
                   </a:rPr>
                   <a:t>User Guide </a:t>
                 </a:r>
-                <a:endParaRPr lang="en-SG" sz="2800" b="1" dirty="0">
-                  <a:solidFill>
-                    <a:schemeClr val="bg1"/>
-                  </a:solidFill>
-                  <a:latin typeface="Segoe Print" panose="02000600000000000000" pitchFamily="2" charset="0"/>
-                </a:endParaRPr>
               </a:p>
             </p:txBody>
           </p:sp>
@@ -5133,7 +5135,7 @@
               <a:graphicData uri="http://schemas.openxmlformats.org/presentationml/2006/ole">
                 <mc:AlternateContent xmlns:mc="http://schemas.openxmlformats.org/markup-compatibility/2006">
                   <mc:Choice xmlns:v="urn:schemas-microsoft-com:vml" Requires="v">
-                    <p:oleObj spid="_x0000_s8197" name="Worksheet" r:id="rId3" imgW="3028999" imgH="1479425" progId="Excel.Sheet.12">
+                    <p:oleObj spid="_x0000_s8199" name="Worksheet" r:id="rId3" imgW="3028999" imgH="1479425" progId="Excel.Sheet.12">
                       <p:embed/>
                     </p:oleObj>
                   </mc:Choice>
@@ -6667,7 +6669,7 @@
             <a:graphicData uri="http://schemas.openxmlformats.org/presentationml/2006/ole">
               <mc:AlternateContent xmlns:mc="http://schemas.openxmlformats.org/markup-compatibility/2006">
                 <mc:Choice xmlns:v="urn:schemas-microsoft-com:vml" Requires="v">
-                  <p:oleObj spid="_x0000_s1039" name="Worksheet" r:id="rId5" imgW="3028999" imgH="1479425" progId="Excel.Sheet.12">
+                  <p:oleObj spid="_x0000_s1041" name="Worksheet" r:id="rId5" imgW="3028999" imgH="1479425" progId="Excel.Sheet.12">
                     <p:embed/>
                   </p:oleObj>
                 </mc:Choice>
@@ -7112,7 +7114,15 @@
                     <a:schemeClr val="bg1"/>
                   </a:solidFill>
                 </a:rPr>
-                <a:t>view 121016</a:t>
+                <a:t>view </a:t>
+              </a:r>
+              <a:r>
+                <a:rPr lang="en-SG" b="1" dirty="0" smtClean="0">
+                  <a:solidFill>
+                    <a:schemeClr val="bg1"/>
+                  </a:solidFill>
+                </a:rPr>
+                <a:t>12-10-2016</a:t>
               </a:r>
               <a:endParaRPr lang="en-SG" b="1" dirty="0">
                 <a:solidFill>
@@ -7222,7 +7232,7 @@
             <a:graphicData uri="http://schemas.openxmlformats.org/presentationml/2006/ole">
               <mc:AlternateContent xmlns:mc="http://schemas.openxmlformats.org/markup-compatibility/2006">
                 <mc:Choice xmlns:v="urn:schemas-microsoft-com:vml" Requires="v">
-                  <p:oleObj spid="_x0000_s3079" name="Worksheet" r:id="rId4" imgW="3028999" imgH="1479425" progId="Excel.Sheet.12">
+                  <p:oleObj spid="_x0000_s3082" name="Worksheet" r:id="rId4" imgW="3028999" imgH="1479425" progId="Excel.Sheet.12">
                     <p:embed/>
                   </p:oleObj>
                 </mc:Choice>
@@ -7909,7 +7919,7 @@
             <a:graphicData uri="http://schemas.openxmlformats.org/presentationml/2006/ole">
               <mc:AlternateContent xmlns:mc="http://schemas.openxmlformats.org/markup-compatibility/2006">
                 <mc:Choice xmlns:v="urn:schemas-microsoft-com:vml" Requires="v">
-                  <p:oleObj spid="_x0000_s4102" name="Worksheet" r:id="rId4" imgW="3028999" imgH="1479425" progId="Excel.Sheet.12">
+                  <p:oleObj spid="_x0000_s4104" name="Worksheet" r:id="rId4" imgW="3028999" imgH="1479425" progId="Excel.Sheet.12">
                     <p:embed/>
                   </p:oleObj>
                 </mc:Choice>
@@ -8552,23 +8562,7 @@
                     <a:schemeClr val="tx1"/>
                   </a:solidFill>
                 </a:rPr>
-                <a:t>Undone </a:t>
-              </a:r>
-              <a:r>
-                <a:rPr lang="en-SG" b="1" dirty="0" smtClean="0">
-                  <a:solidFill>
-                    <a:schemeClr val="tx1"/>
-                  </a:solidFill>
-                </a:rPr>
-                <a:t>the following </a:t>
-              </a:r>
-              <a:r>
-                <a:rPr lang="en-SG" b="1" dirty="0" smtClean="0">
-                  <a:solidFill>
-                    <a:schemeClr val="tx1"/>
-                  </a:solidFill>
-                </a:rPr>
-                <a:t>command: </a:t>
+                <a:t>Undone the following command: </a:t>
               </a:r>
             </a:p>
             <a:p>
@@ -8606,7 +8600,7 @@
             <a:graphicData uri="http://schemas.openxmlformats.org/presentationml/2006/ole">
               <mc:AlternateContent xmlns:mc="http://schemas.openxmlformats.org/markup-compatibility/2006">
                 <mc:Choice xmlns:v="urn:schemas-microsoft-com:vml" Requires="v">
-                  <p:oleObj spid="_x0000_s5125" name="Worksheet" r:id="rId3" imgW="3028999" imgH="1479425" progId="Excel.Sheet.12">
+                  <p:oleObj spid="_x0000_s5127" name="Worksheet" r:id="rId3" imgW="3028999" imgH="1479425" progId="Excel.Sheet.12">
                     <p:embed/>
                   </p:oleObj>
                 </mc:Choice>
@@ -9240,23 +9234,7 @@
                     <a:schemeClr val="tx1"/>
                   </a:solidFill>
                 </a:rPr>
-                <a:t>Re-executed </a:t>
-              </a:r>
-              <a:r>
-                <a:rPr lang="en-SG" b="1" dirty="0" smtClean="0">
-                  <a:solidFill>
-                    <a:schemeClr val="tx1"/>
-                  </a:solidFill>
-                </a:rPr>
-                <a:t>the following </a:t>
-              </a:r>
-              <a:r>
-                <a:rPr lang="en-SG" b="1" dirty="0" smtClean="0">
-                  <a:solidFill>
-                    <a:schemeClr val="tx1"/>
-                  </a:solidFill>
-                </a:rPr>
-                <a:t>command: </a:t>
+                <a:t>Re-executed the following command: </a:t>
               </a:r>
             </a:p>
             <a:p>
@@ -9294,7 +9272,7 @@
             <a:graphicData uri="http://schemas.openxmlformats.org/presentationml/2006/ole">
               <mc:AlternateContent xmlns:mc="http://schemas.openxmlformats.org/markup-compatibility/2006">
                 <mc:Choice xmlns:v="urn:schemas-microsoft-com:vml" Requires="v">
-                  <p:oleObj spid="_x0000_s6148" name="Worksheet" r:id="rId3" imgW="3028999" imgH="1479425" progId="Excel.Sheet.12">
+                  <p:oleObj spid="_x0000_s6150" name="Worksheet" r:id="rId3" imgW="3028999" imgH="1479425" progId="Excel.Sheet.12">
                     <p:embed/>
                   </p:oleObj>
                 </mc:Choice>
@@ -9983,7 +9961,7 @@
             <a:graphicData uri="http://schemas.openxmlformats.org/presentationml/2006/ole">
               <mc:AlternateContent xmlns:mc="http://schemas.openxmlformats.org/markup-compatibility/2006">
                 <mc:Choice xmlns:v="urn:schemas-microsoft-com:vml" Requires="v">
-                  <p:oleObj spid="_x0000_s7172" name="Worksheet" r:id="rId3" imgW="3028999" imgH="1479425" progId="Excel.Sheet.12">
+                  <p:oleObj spid="_x0000_s7174" name="Worksheet" r:id="rId3" imgW="3028999" imgH="1479425" progId="Excel.Sheet.12">
                     <p:embed/>
                   </p:oleObj>
                 </mc:Choice>

</xml_diff>